<commit_message>
UPDATES TO PRESENTATION & PRESENTATION MATERIALS
</commit_message>
<xml_diff>
--- a/Presentation 4/Presentation.pptx
+++ b/Presentation 4/Presentation.pptx
@@ -229,7 +229,7 @@
           <a:p>
             <a:fld id="{5627325D-7C6B-4659-A656-A772019985A7}" type="datetimeFigureOut">
               <a:rPr lang="en-US" smtClean="0"/>
-              <a:t>11/13/2017</a:t>
+              <a:t>11/14/2017</a:t>
             </a:fld>
             <a:endParaRPr lang="en-US" dirty="0"/>
           </a:p>
@@ -394,7 +394,7 @@
           <a:p>
             <a:fld id="{D75FD80F-0FDC-4A05-9EF1-C028EC4EDC0A}" type="datetimeFigureOut">
               <a:rPr lang="en-US" smtClean="0"/>
-              <a:t>11/13/2017</a:t>
+              <a:t>11/14/2017</a:t>
             </a:fld>
             <a:endParaRPr lang="en-US" dirty="0"/>
           </a:p>
@@ -952,7 +952,7 @@
             <a:fld id="{349BF3EA-1A78-4F07-BDC0-C8A1BD461199}" type="datetimeFigureOut">
               <a:rPr lang="en-US" smtClean="0"/>
               <a:pPr/>
-              <a:t>11/13/2017</a:t>
+              <a:t>11/14/2017</a:t>
             </a:fld>
             <a:endParaRPr lang="en-US" dirty="0"/>
           </a:p>
@@ -1156,7 +1156,7 @@
           <a:p>
             <a:fld id="{349BF3EA-1A78-4F07-BDC0-C8A1BD461199}" type="datetimeFigureOut">
               <a:rPr lang="en-US" smtClean="0"/>
-              <a:t>11/13/2017</a:t>
+              <a:t>11/14/2017</a:t>
             </a:fld>
             <a:endParaRPr lang="en-US" dirty="0"/>
           </a:p>
@@ -1443,7 +1443,7 @@
           <a:p>
             <a:fld id="{349BF3EA-1A78-4F07-BDC0-C8A1BD461199}" type="datetimeFigureOut">
               <a:rPr lang="en-US" smtClean="0"/>
-              <a:t>11/13/2017</a:t>
+              <a:t>11/14/2017</a:t>
             </a:fld>
             <a:endParaRPr lang="en-US" dirty="0"/>
           </a:p>
@@ -1643,7 +1643,7 @@
           <a:p>
             <a:fld id="{349BF3EA-1A78-4F07-BDC0-C8A1BD461199}" type="datetimeFigureOut">
               <a:rPr lang="en-US" smtClean="0"/>
-              <a:t>11/13/2017</a:t>
+              <a:t>11/14/2017</a:t>
             </a:fld>
             <a:endParaRPr lang="en-US" dirty="0"/>
           </a:p>
@@ -2007,7 +2007,7 @@
           <a:p>
             <a:fld id="{349BF3EA-1A78-4F07-BDC0-C8A1BD461199}" type="datetimeFigureOut">
               <a:rPr lang="en-US" smtClean="0"/>
-              <a:t>11/13/2017</a:t>
+              <a:t>11/14/2017</a:t>
             </a:fld>
             <a:endParaRPr lang="en-US" dirty="0"/>
           </a:p>
@@ -2329,7 +2329,7 @@
           <a:p>
             <a:fld id="{349BF3EA-1A78-4F07-BDC0-C8A1BD461199}" type="datetimeFigureOut">
               <a:rPr lang="en-US" smtClean="0"/>
-              <a:t>11/13/2017</a:t>
+              <a:t>11/14/2017</a:t>
             </a:fld>
             <a:endParaRPr lang="en-US" dirty="0"/>
           </a:p>
@@ -2773,7 +2773,7 @@
           <a:p>
             <a:fld id="{349BF3EA-1A78-4F07-BDC0-C8A1BD461199}" type="datetimeFigureOut">
               <a:rPr lang="en-US" smtClean="0"/>
-              <a:t>11/13/2017</a:t>
+              <a:t>11/14/2017</a:t>
             </a:fld>
             <a:endParaRPr lang="en-US" dirty="0"/>
           </a:p>
@@ -2905,7 +2905,7 @@
           <a:p>
             <a:fld id="{349BF3EA-1A78-4F07-BDC0-C8A1BD461199}" type="datetimeFigureOut">
               <a:rPr lang="en-US" smtClean="0"/>
-              <a:t>11/13/2017</a:t>
+              <a:t>11/14/2017</a:t>
             </a:fld>
             <a:endParaRPr lang="en-US" dirty="0"/>
           </a:p>
@@ -3061,7 +3061,7 @@
           <a:p>
             <a:fld id="{349BF3EA-1A78-4F07-BDC0-C8A1BD461199}" type="datetimeFigureOut">
               <a:rPr lang="en-US" smtClean="0"/>
-              <a:t>11/13/2017</a:t>
+              <a:t>11/14/2017</a:t>
             </a:fld>
             <a:endParaRPr lang="en-US" dirty="0"/>
           </a:p>
@@ -3498,7 +3498,7 @@
           <a:p>
             <a:fld id="{349BF3EA-1A78-4F07-BDC0-C8A1BD461199}" type="datetimeFigureOut">
               <a:rPr lang="en-US" smtClean="0"/>
-              <a:t>11/13/2017</a:t>
+              <a:t>11/14/2017</a:t>
             </a:fld>
             <a:endParaRPr lang="en-US" dirty="0"/>
           </a:p>
@@ -3905,7 +3905,7 @@
             <a:fld id="{349BF3EA-1A78-4F07-BDC0-C8A1BD461199}" type="datetimeFigureOut">
               <a:rPr lang="en-US" smtClean="0"/>
               <a:pPr/>
-              <a:t>11/13/2017</a:t>
+              <a:t>11/14/2017</a:t>
             </a:fld>
             <a:endParaRPr lang="en-US" dirty="0"/>
           </a:p>
@@ -4249,7 +4249,7 @@
             <a:fld id="{349BF3EA-1A78-4F07-BDC0-C8A1BD461199}" type="datetimeFigureOut">
               <a:rPr lang="en-US" smtClean="0"/>
               <a:pPr/>
-              <a:t>11/13/2017</a:t>
+              <a:t>11/14/2017</a:t>
             </a:fld>
             <a:endParaRPr lang="en-US" dirty="0"/>
           </a:p>
@@ -5028,7 +5028,7 @@
           <a:graphicData uri="http://schemas.openxmlformats.org/presentationml/2006/ole">
             <mc:AlternateContent xmlns:mc="http://schemas.openxmlformats.org/markup-compatibility/2006">
               <mc:Choice xmlns:v="urn:schemas-microsoft-com:vml" Requires="v">
-                <p:oleObj spid="_x0000_s1042" name="Worksheet" r:id="rId3" imgW="8924969" imgH="1914761" progId="Excel.Sheet.12">
+                <p:oleObj spid="_x0000_s1044" name="Worksheet" r:id="rId3" imgW="8924969" imgH="1914761" progId="Excel.Sheet.12">
                   <p:embed/>
                 </p:oleObj>
               </mc:Choice>
@@ -5230,10 +5230,10 @@
       </p:sp>
       <p:pic>
         <p:nvPicPr>
-          <p:cNvPr id="6" name="Content Placeholder 5">
+          <p:cNvPr id="7" name="Content Placeholder 6">
             <a:extLst>
               <a:ext uri="{FF2B5EF4-FFF2-40B4-BE49-F238E27FC236}">
-                <a16:creationId xmlns:a16="http://schemas.microsoft.com/office/drawing/2014/main" id="{1F907416-C8FB-4E9D-91E8-63A71292330B}"/>
+                <a16:creationId xmlns:a16="http://schemas.microsoft.com/office/drawing/2014/main" id="{A6C8D1DA-8385-4A4F-9B8D-080ABA2C9A5E}"/>
               </a:ext>
             </a:extLst>
           </p:cNvPr>
@@ -5335,10 +5335,10 @@
       </p:sp>
       <p:pic>
         <p:nvPicPr>
-          <p:cNvPr id="7" name="Content Placeholder 6">
+          <p:cNvPr id="6" name="Content Placeholder 5">
             <a:extLst>
               <a:ext uri="{FF2B5EF4-FFF2-40B4-BE49-F238E27FC236}">
-                <a16:creationId xmlns:a16="http://schemas.microsoft.com/office/drawing/2014/main" id="{EA3EF9EB-1810-4557-8C55-7DA3320325E0}"/>
+                <a16:creationId xmlns:a16="http://schemas.microsoft.com/office/drawing/2014/main" id="{C8B1A1A7-3F97-4232-9B9C-98555A1D34EC}"/>
               </a:ext>
             </a:extLst>
           </p:cNvPr>
@@ -5363,8 +5363,8 @@
         </p:blipFill>
         <p:spPr>
           <a:xfrm>
-            <a:off x="1229926" y="1759663"/>
-            <a:ext cx="9767073" cy="4326099"/>
+            <a:off x="1227339" y="1758518"/>
+            <a:ext cx="9772246" cy="4328390"/>
           </a:xfrm>
         </p:spPr>
       </p:pic>

</xml_diff>

<commit_message>
Added a line to Presentation (Refactor Slide)
</commit_message>
<xml_diff>
--- a/Presentation 4/Presentation.pptx
+++ b/Presentation 4/Presentation.pptx
@@ -4927,6 +4927,15 @@
           <a:p>
             <a:endParaRPr lang="en-US" dirty="0"/>
           </a:p>
+          <a:p>
+            <a:r>
+              <a:rPr lang="en-US" dirty="0"/>
+              <a:t>Removed Log.java, Profile.java, and Invitation.java</a:t>
+            </a:r>
+          </a:p>
+          <a:p>
+            <a:endParaRPr lang="en-US" dirty="0"/>
+          </a:p>
         </p:txBody>
       </p:sp>
     </p:spTree>
@@ -5028,7 +5037,7 @@
           <a:graphicData uri="http://schemas.openxmlformats.org/presentationml/2006/ole">
             <mc:AlternateContent xmlns:mc="http://schemas.openxmlformats.org/markup-compatibility/2006">
               <mc:Choice xmlns:v="urn:schemas-microsoft-com:vml" Requires="v">
-                <p:oleObj spid="_x0000_s1044" name="Worksheet" r:id="rId3" imgW="8924969" imgH="1914761" progId="Excel.Sheet.12">
+                <p:oleObj spid="_x0000_s1046" name="Worksheet" r:id="rId3" imgW="8924969" imgH="1914761" progId="Excel.Sheet.12">
                   <p:embed/>
                 </p:oleObj>
               </mc:Choice>

</xml_diff>